<commit_message>
Adicionado caso de uso de sucesso
</commit_message>
<xml_diff>
--- a/docs/Sprint_A_Apresentacao_v0.pptx
+++ b/docs/Sprint_A_Apresentacao_v0.pptx
@@ -136,6 +136,97 @@
     </p:ext>
   </p:extLst>
 </p:presentation>
+</file>
+
+<file path=ppt/revisionInfo.xml><?xml version="1.0" encoding="utf-8"?>
+<p1510:revInfo xmlns:a="http://schemas.openxmlformats.org/drawingml/2006/main" xmlns:r="http://schemas.openxmlformats.org/officeDocument/2006/relationships" xmlns:p1510="http://schemas.microsoft.com/office/powerpoint/2015/10/main">
+  <p1510:revLst>
+    <p1510:client id="{6BE273F3-E72E-40AA-A817-98C20B5011C2}" v="2" dt="2025-11-28T21:27:57.499"/>
+  </p1510:revLst>
+</p1510:revInfo>
+</file>
+
+<file path=ppt/changesInfos/changesInfo1.xml><?xml version="1.0" encoding="utf-8"?>
+<pc:chgInfo xmlns:a="http://schemas.openxmlformats.org/drawingml/2006/main" xmlns:r="http://schemas.openxmlformats.org/officeDocument/2006/relationships" xmlns:ac="http://schemas.microsoft.com/office/drawing/2013/main/command" xmlns:pc="http://schemas.microsoft.com/office/powerpoint/2013/main/command">
+  <pc:docChgLst>
+    <pc:chgData name="João Francisco Ventura" userId="2b823f3e-e005-46e5-b32e-2e12a8980972" providerId="ADAL" clId="{CF83E829-C634-4ADE-AC63-0B47AE628D92}"/>
+    <pc:docChg chg="undo custSel modSld">
+      <pc:chgData name="João Francisco Ventura" userId="2b823f3e-e005-46e5-b32e-2e12a8980972" providerId="ADAL" clId="{CF83E829-C634-4ADE-AC63-0B47AE628D92}" dt="2025-11-28T21:56:18.785" v="57" actId="14100"/>
+      <pc:docMkLst>
+        <pc:docMk/>
+      </pc:docMkLst>
+      <pc:sldChg chg="addSp modSp mod">
+        <pc:chgData name="João Francisco Ventura" userId="2b823f3e-e005-46e5-b32e-2e12a8980972" providerId="ADAL" clId="{CF83E829-C634-4ADE-AC63-0B47AE628D92}" dt="2025-11-28T21:30:12.103" v="47" actId="732"/>
+        <pc:sldMkLst>
+          <pc:docMk/>
+          <pc:sldMk cId="0" sldId="258"/>
+        </pc:sldMkLst>
+        <pc:picChg chg="add mod modCrop">
+          <ac:chgData name="João Francisco Ventura" userId="2b823f3e-e005-46e5-b32e-2e12a8980972" providerId="ADAL" clId="{CF83E829-C634-4ADE-AC63-0B47AE628D92}" dt="2025-11-28T21:30:12.103" v="47" actId="732"/>
+          <ac:picMkLst>
+            <pc:docMk/>
+            <pc:sldMk cId="0" sldId="258"/>
+            <ac:picMk id="6" creationId="{C7F6E3D5-B525-1B59-9ED1-970EF36C72B1}"/>
+          </ac:picMkLst>
+        </pc:picChg>
+      </pc:sldChg>
+      <pc:sldChg chg="addSp delSp modSp mod">
+        <pc:chgData name="João Francisco Ventura" userId="2b823f3e-e005-46e5-b32e-2e12a8980972" providerId="ADAL" clId="{CF83E829-C634-4ADE-AC63-0B47AE628D92}" dt="2025-11-28T21:56:18.785" v="57" actId="14100"/>
+        <pc:sldMkLst>
+          <pc:docMk/>
+          <pc:sldMk cId="0" sldId="260"/>
+        </pc:sldMkLst>
+        <pc:spChg chg="add del mod">
+          <ac:chgData name="João Francisco Ventura" userId="2b823f3e-e005-46e5-b32e-2e12a8980972" providerId="ADAL" clId="{CF83E829-C634-4ADE-AC63-0B47AE628D92}" dt="2025-11-28T21:56:18.631" v="56" actId="22"/>
+          <ac:spMkLst>
+            <pc:docMk/>
+            <pc:sldMk cId="0" sldId="260"/>
+            <ac:spMk id="7" creationId="{9AE4C428-BF5A-9DA9-BEBF-C348619CD407}"/>
+          </ac:spMkLst>
+        </pc:spChg>
+        <pc:graphicFrameChg chg="mod">
+          <ac:chgData name="João Francisco Ventura" userId="2b823f3e-e005-46e5-b32e-2e12a8980972" providerId="ADAL" clId="{CF83E829-C634-4ADE-AC63-0B47AE628D92}" dt="2025-11-28T21:56:18.785" v="57" actId="14100"/>
+          <ac:graphicFrameMkLst>
+            <pc:docMk/>
+            <pc:sldMk cId="0" sldId="260"/>
+            <ac:graphicFrameMk id="6" creationId="{19BDD062-E420-9513-5551-941B701490A5}"/>
+          </ac:graphicFrameMkLst>
+        </pc:graphicFrameChg>
+      </pc:sldChg>
+      <pc:sldChg chg="addSp delSp modSp mod">
+        <pc:chgData name="João Francisco Ventura" userId="2b823f3e-e005-46e5-b32e-2e12a8980972" providerId="ADAL" clId="{CF83E829-C634-4ADE-AC63-0B47AE628D92}" dt="2025-11-28T21:28:44.061" v="10" actId="14100"/>
+        <pc:sldMkLst>
+          <pc:docMk/>
+          <pc:sldMk cId="4023130912" sldId="275"/>
+        </pc:sldMkLst>
+        <pc:spChg chg="mod">
+          <ac:chgData name="João Francisco Ventura" userId="2b823f3e-e005-46e5-b32e-2e12a8980972" providerId="ADAL" clId="{CF83E829-C634-4ADE-AC63-0B47AE628D92}" dt="2025-11-28T21:28:44.061" v="10" actId="14100"/>
+          <ac:spMkLst>
+            <pc:docMk/>
+            <pc:sldMk cId="4023130912" sldId="275"/>
+            <ac:spMk id="2" creationId="{C630569F-B1F3-3422-2C79-4BD6C5C92740}"/>
+          </ac:spMkLst>
+        </pc:spChg>
+        <pc:picChg chg="add mod">
+          <ac:chgData name="João Francisco Ventura" userId="2b823f3e-e005-46e5-b32e-2e12a8980972" providerId="ADAL" clId="{CF83E829-C634-4ADE-AC63-0B47AE628D92}" dt="2025-11-28T21:28:10.725" v="9" actId="1076"/>
+          <ac:picMkLst>
+            <pc:docMk/>
+            <pc:sldMk cId="4023130912" sldId="275"/>
+            <ac:picMk id="5" creationId="{F0CBFA6D-BDFA-2026-3B62-6980E74BB335}"/>
+          </ac:picMkLst>
+        </pc:picChg>
+        <pc:picChg chg="del">
+          <ac:chgData name="João Francisco Ventura" userId="2b823f3e-e005-46e5-b32e-2e12a8980972" providerId="ADAL" clId="{CF83E829-C634-4ADE-AC63-0B47AE628D92}" dt="2025-11-28T21:27:57.499" v="4" actId="478"/>
+          <ac:picMkLst>
+            <pc:docMk/>
+            <pc:sldMk cId="4023130912" sldId="275"/>
+            <ac:picMk id="2052" creationId="{20ADEBDB-F32B-B9EB-D696-6FE75BDCA33D}"/>
+          </ac:picMkLst>
+        </pc:picChg>
+      </pc:sldChg>
+    </pc:docChg>
+  </pc:docChgLst>
+</pc:chgInfo>
 </file>
 
 <file path=ppt/diagrams/colors1.xml><?xml version="1.0" encoding="utf-8"?>
@@ -2937,8 +3028,24 @@
         <a:lstStyle/>
         <a:p>
           <a:r>
-            <a:rPr lang="en-US"/>
-            <a:t>3. Executar modelo SIR</a:t>
+            <a:rPr lang="en-US" dirty="0"/>
+            <a:t>3. </a:t>
+          </a:r>
+          <a:r>
+            <a:rPr lang="en-US" dirty="0" err="1"/>
+            <a:t>Executar</a:t>
+          </a:r>
+          <a:r>
+            <a:rPr lang="en-US" dirty="0"/>
+            <a:t> </a:t>
+          </a:r>
+          <a:r>
+            <a:rPr lang="en-US" dirty="0" err="1"/>
+            <a:t>modelo</a:t>
+          </a:r>
+          <a:r>
+            <a:rPr lang="en-US" dirty="0"/>
+            <a:t> SIR</a:t>
           </a:r>
         </a:p>
       </dgm:t>
@@ -4392,8 +4499,24 @@
             <a:buNone/>
           </a:pPr>
           <a:r>
-            <a:rPr lang="en-US" sz="1300" kern="1200"/>
-            <a:t>3. Executar modelo SIR</a:t>
+            <a:rPr lang="en-US" sz="1300" kern="1200" dirty="0"/>
+            <a:t>3. </a:t>
+          </a:r>
+          <a:r>
+            <a:rPr lang="en-US" sz="1300" kern="1200" dirty="0" err="1"/>
+            <a:t>Executar</a:t>
+          </a:r>
+          <a:r>
+            <a:rPr lang="en-US" sz="1300" kern="1200" dirty="0"/>
+            <a:t> </a:t>
+          </a:r>
+          <a:r>
+            <a:rPr lang="en-US" sz="1300" kern="1200" dirty="0" err="1"/>
+            <a:t>modelo</a:t>
+          </a:r>
+          <a:r>
+            <a:rPr lang="en-US" sz="1300" kern="1200" dirty="0"/>
+            <a:t> SIR</a:t>
           </a:r>
         </a:p>
       </dsp:txBody>
@@ -14601,6 +14724,37 @@
           <a:noFill/>
         </p:spPr>
       </p:pic>
+      <p:pic>
+        <p:nvPicPr>
+          <p:cNvPr id="6" name="Picture 5">
+            <a:extLst>
+              <a:ext uri="{FF2B5EF4-FFF2-40B4-BE49-F238E27FC236}">
+                <a16:creationId xmlns:a16="http://schemas.microsoft.com/office/drawing/2014/main" id="{C7F6E3D5-B525-1B59-9ED1-970EF36C72B1}"/>
+              </a:ext>
+            </a:extLst>
+          </p:cNvPr>
+          <p:cNvPicPr>
+            <a:picLocks noChangeAspect="1"/>
+          </p:cNvPicPr>
+          <p:nvPr/>
+        </p:nvPicPr>
+        <p:blipFill>
+          <a:blip r:embed="rId3"/>
+          <a:srcRect t="1236" r="300" b="1301"/>
+          <a:stretch>
+            <a:fillRect/>
+          </a:stretch>
+        </p:blipFill>
+        <p:spPr>
+          <a:xfrm>
+            <a:off x="3035060" y="838200"/>
+            <a:ext cx="6084000" cy="5157784"/>
+          </a:xfrm>
+          <a:prstGeom prst="rect">
+            <a:avLst/>
+          </a:prstGeom>
+        </p:spPr>
+      </p:pic>
     </p:spTree>
   </p:cSld>
   <p:clrMapOvr>
@@ -15733,7 +15887,7 @@
             <p:ph idx="1"/>
             <p:extLst>
               <p:ext uri="{D42A27DB-BD31-4B8C-83A1-F6EECF244321}">
-                <p14:modId xmlns:p14="http://schemas.microsoft.com/office/powerpoint/2010/main" val="2677156726"/>
+                <p14:modId xmlns:p14="http://schemas.microsoft.com/office/powerpoint/2010/main" val="1481074133"/>
               </p:ext>
             </p:extLst>
           </p:nvPr>
@@ -16306,7 +16460,7 @@
         <p:spPr>
           <a:xfrm>
             <a:off x="495030" y="2767106"/>
-            <a:ext cx="2160621" cy="3071906"/>
+            <a:ext cx="2160621" cy="1300069"/>
           </a:xfrm>
         </p:spPr>
         <p:txBody>
@@ -16436,49 +16590,32 @@
       </p:pic>
       <p:pic>
         <p:nvPicPr>
-          <p:cNvPr id="2052" name="Picture 4">
+          <p:cNvPr id="5" name="Picture 4" descr="A screenshot of a flowchart&#10;&#10;AI-generated content may be incorrect.">
             <a:extLst>
               <a:ext uri="{FF2B5EF4-FFF2-40B4-BE49-F238E27FC236}">
-                <a16:creationId xmlns:a16="http://schemas.microsoft.com/office/drawing/2014/main" id="{20ADEBDB-F32B-B9EB-D696-6FE75BDCA33D}"/>
+                <a16:creationId xmlns:a16="http://schemas.microsoft.com/office/drawing/2014/main" id="{F0CBFA6D-BDFA-2026-3B62-6980E74BB335}"/>
               </a:ext>
             </a:extLst>
           </p:cNvPr>
           <p:cNvPicPr>
-            <a:picLocks noChangeAspect="1" noChangeArrowheads="1"/>
+            <a:picLocks noChangeAspect="1"/>
           </p:cNvPicPr>
           <p:nvPr/>
         </p:nvPicPr>
         <p:blipFill>
-          <a:blip r:embed="rId3">
-            <a:extLst>
-              <a:ext uri="{28A0092B-C50C-407E-A947-70E740481C1C}">
-                <a14:useLocalDpi xmlns:a14="http://schemas.microsoft.com/office/drawing/2010/main" val="0"/>
-              </a:ext>
-            </a:extLst>
-          </a:blip>
-          <a:srcRect/>
+          <a:blip r:embed="rId3"/>
           <a:stretch>
             <a:fillRect/>
           </a:stretch>
         </p:blipFill>
-        <p:spPr bwMode="auto">
+        <p:spPr>
           <a:xfrm>
-            <a:off x="3028951" y="8482"/>
-            <a:ext cx="6039253" cy="6858000"/>
+            <a:off x="2542954" y="182897"/>
+            <a:ext cx="6403307" cy="6320684"/>
           </a:xfrm>
           <a:prstGeom prst="rect">
             <a:avLst/>
           </a:prstGeom>
-          <a:noFill/>
-          <a:extLst>
-            <a:ext uri="{909E8E84-426E-40DD-AFC4-6F175D3DCCD1}">
-              <a14:hiddenFill xmlns:a14="http://schemas.microsoft.com/office/drawing/2010/main">
-                <a:solidFill>
-                  <a:srgbClr val="FFFFFF"/>
-                </a:solidFill>
-              </a14:hiddenFill>
-            </a:ext>
-          </a:extLst>
         </p:spPr>
       </p:pic>
     </p:spTree>

</xml_diff>